<commit_message>
Refactored code fixing items listed in Issue #16
</commit_message>
<xml_diff>
--- a/solutions/guardduty/guardduty-org/documentation/diagram/Organization-GuardDuty-Architecture.pptx
+++ b/solutions/guardduty/guardduty-org/documentation/diagram/Organization-GuardDuty-Architecture.pptx
@@ -197,7 +197,7 @@
           <a:p>
             <a:fld id="{FD8D84E3-00BA-4A46-8256-7E527D8B4480}" type="datetimeFigureOut">
               <a:rPr lang="en-US" smtClean="0"/>
-              <a:t>11/2/20</a:t>
+              <a:t>4/20/21</a:t>
             </a:fld>
             <a:endParaRPr lang="en-US"/>
           </a:p>
@@ -695,7 +695,7 @@
           <a:p>
             <a:fld id="{9FE185F7-9B28-9F45-9F43-9CB5A0B99390}" type="datetimeFigureOut">
               <a:rPr lang="en-US" smtClean="0"/>
-              <a:t>11/2/20</a:t>
+              <a:t>4/20/21</a:t>
             </a:fld>
             <a:endParaRPr lang="en-US"/>
           </a:p>
@@ -893,7 +893,7 @@
           <a:p>
             <a:fld id="{9FE185F7-9B28-9F45-9F43-9CB5A0B99390}" type="datetimeFigureOut">
               <a:rPr lang="en-US" smtClean="0"/>
-              <a:t>11/2/20</a:t>
+              <a:t>4/20/21</a:t>
             </a:fld>
             <a:endParaRPr lang="en-US"/>
           </a:p>
@@ -1101,7 +1101,7 @@
           <a:p>
             <a:fld id="{9FE185F7-9B28-9F45-9F43-9CB5A0B99390}" type="datetimeFigureOut">
               <a:rPr lang="en-US" smtClean="0"/>
-              <a:t>11/2/20</a:t>
+              <a:t>4/20/21</a:t>
             </a:fld>
             <a:endParaRPr lang="en-US"/>
           </a:p>
@@ -1299,7 +1299,7 @@
           <a:p>
             <a:fld id="{9FE185F7-9B28-9F45-9F43-9CB5A0B99390}" type="datetimeFigureOut">
               <a:rPr lang="en-US" smtClean="0"/>
-              <a:t>11/2/20</a:t>
+              <a:t>4/20/21</a:t>
             </a:fld>
             <a:endParaRPr lang="en-US"/>
           </a:p>
@@ -1574,7 +1574,7 @@
           <a:p>
             <a:fld id="{9FE185F7-9B28-9F45-9F43-9CB5A0B99390}" type="datetimeFigureOut">
               <a:rPr lang="en-US" smtClean="0"/>
-              <a:t>11/2/20</a:t>
+              <a:t>4/20/21</a:t>
             </a:fld>
             <a:endParaRPr lang="en-US"/>
           </a:p>
@@ -1839,7 +1839,7 @@
           <a:p>
             <a:fld id="{9FE185F7-9B28-9F45-9F43-9CB5A0B99390}" type="datetimeFigureOut">
               <a:rPr lang="en-US" smtClean="0"/>
-              <a:t>11/2/20</a:t>
+              <a:t>4/20/21</a:t>
             </a:fld>
             <a:endParaRPr lang="en-US"/>
           </a:p>
@@ -2251,7 +2251,7 @@
           <a:p>
             <a:fld id="{9FE185F7-9B28-9F45-9F43-9CB5A0B99390}" type="datetimeFigureOut">
               <a:rPr lang="en-US" smtClean="0"/>
-              <a:t>11/2/20</a:t>
+              <a:t>4/20/21</a:t>
             </a:fld>
             <a:endParaRPr lang="en-US"/>
           </a:p>
@@ -2392,7 +2392,7 @@
           <a:p>
             <a:fld id="{9FE185F7-9B28-9F45-9F43-9CB5A0B99390}" type="datetimeFigureOut">
               <a:rPr lang="en-US" smtClean="0"/>
-              <a:t>11/2/20</a:t>
+              <a:t>4/20/21</a:t>
             </a:fld>
             <a:endParaRPr lang="en-US"/>
           </a:p>
@@ -2505,7 +2505,7 @@
           <a:p>
             <a:fld id="{9FE185F7-9B28-9F45-9F43-9CB5A0B99390}" type="datetimeFigureOut">
               <a:rPr lang="en-US" smtClean="0"/>
-              <a:t>11/2/20</a:t>
+              <a:t>4/20/21</a:t>
             </a:fld>
             <a:endParaRPr lang="en-US"/>
           </a:p>
@@ -2816,7 +2816,7 @@
           <a:p>
             <a:fld id="{9FE185F7-9B28-9F45-9F43-9CB5A0B99390}" type="datetimeFigureOut">
               <a:rPr lang="en-US" smtClean="0"/>
-              <a:t>11/2/20</a:t>
+              <a:t>4/20/21</a:t>
             </a:fld>
             <a:endParaRPr lang="en-US"/>
           </a:p>
@@ -3104,7 +3104,7 @@
           <a:p>
             <a:fld id="{9FE185F7-9B28-9F45-9F43-9CB5A0B99390}" type="datetimeFigureOut">
               <a:rPr lang="en-US" smtClean="0"/>
-              <a:t>11/2/20</a:t>
+              <a:t>4/20/21</a:t>
             </a:fld>
             <a:endParaRPr lang="en-US"/>
           </a:p>
@@ -3345,7 +3345,7 @@
           <a:p>
             <a:fld id="{9FE185F7-9B28-9F45-9F43-9CB5A0B99390}" type="datetimeFigureOut">
               <a:rPr lang="en-US" smtClean="0"/>
-              <a:t>11/2/20</a:t>
+              <a:t>4/20/21</a:t>
             </a:fld>
             <a:endParaRPr lang="en-US"/>
           </a:p>
@@ -3782,11 +3782,7 @@
           <a:prstGeom prst="rect">
             <a:avLst/>
           </a:prstGeom>
-          <a:solidFill>
-            <a:srgbClr val="5A6B86">
-              <a:alpha val="9804"/>
-            </a:srgbClr>
-          </a:solidFill>
+          <a:noFill/>
           <a:ln w="12700">
             <a:solidFill>
               <a:srgbClr val="002060"/>
@@ -3826,7 +3822,18 @@
                   <a:schemeClr val="tx1"/>
                 </a:solidFill>
               </a:rPr>
-              <a:t>Organization Primary Account</a:t>
+              <a:t>Organization Management Account</a:t>
+            </a:r>
+          </a:p>
+          <a:p>
+            <a:pPr algn="ctr"/>
+            <a:r>
+              <a:rPr lang="en-US" sz="1400" dirty="0">
+                <a:solidFill>
+                  <a:schemeClr val="tx1"/>
+                </a:solidFill>
+              </a:rPr>
+              <a:t>OU: primary</a:t>
             </a:r>
           </a:p>
         </p:txBody>
@@ -4042,11 +4049,7 @@
           <a:prstGeom prst="rect">
             <a:avLst/>
           </a:prstGeom>
-          <a:solidFill>
-            <a:srgbClr val="5A6B86">
-              <a:alpha val="9804"/>
-            </a:srgbClr>
-          </a:solidFill>
+          <a:noFill/>
           <a:ln w="12700">
             <a:solidFill>
               <a:srgbClr val="002060"/>
@@ -4122,11 +4125,7 @@
           <a:prstGeom prst="rect">
             <a:avLst/>
           </a:prstGeom>
-          <a:solidFill>
-            <a:srgbClr val="5A6B86">
-              <a:alpha val="9804"/>
-            </a:srgbClr>
-          </a:solidFill>
+          <a:noFill/>
           <a:ln w="12700">
             <a:solidFill>
               <a:schemeClr val="tx1"/>
@@ -6239,11 +6238,7 @@
           <a:prstGeom prst="rect">
             <a:avLst/>
           </a:prstGeom>
-          <a:solidFill>
-            <a:srgbClr val="5A6B86">
-              <a:alpha val="9804"/>
-            </a:srgbClr>
-          </a:solidFill>
+          <a:noFill/>
           <a:ln w="12700">
             <a:solidFill>
               <a:srgbClr val="002060"/>
@@ -7062,7 +7057,7 @@
         </p:nvSpPr>
         <p:spPr>
           <a:xfrm>
-            <a:off x="8592271" y="1698377"/>
+            <a:off x="8601999" y="1698377"/>
             <a:ext cx="253435" cy="212902"/>
           </a:xfrm>
           <a:prstGeom prst="ellipse">

</xml_diff>